<commit_message>
implemented new portal behavior
- spawn entrance and exit portal and track when player goes through them
- add a script to control animations on the portal
- add temp sounds for when portal appears, disappears
- remove old "number of portals" tracking and replace with "# of candles
lit" output
</commit_message>
<xml_diff>
--- a/docs/8NightsVRDesign_Rev2.pptx
+++ b/docs/8NightsVRDesign_Rev2.pptx
@@ -27,6 +27,7 @@
     <p:sldId id="278" r:id="rId21"/>
     <p:sldId id="279" r:id="rId22"/>
     <p:sldId id="267" r:id="rId23"/>
+    <p:sldId id="280" r:id="rId24"/>
   </p:sldIdLst>
   <p:sldSz cx="12192000" cy="6858000"/>
   <p:notesSz cx="6858000" cy="9144000"/>
@@ -5242,23 +5243,7 @@
             <a:pPr algn="ctr"/>
             <a:r>
               <a:rPr lang="en-US" dirty="0" smtClean="0"/>
-              <a:t>If the VR person strays too far from the path, their torch blows </a:t>
-            </a:r>
-            <a:r>
-              <a:rPr lang="en-US" dirty="0" smtClean="0"/>
-              <a:t>out.  </a:t>
-            </a:r>
-            <a:r>
-              <a:rPr lang="en-US" dirty="0" smtClean="0"/>
-              <a:t>Back to the </a:t>
-            </a:r>
-            <a:r>
-              <a:rPr lang="en-US" dirty="0" smtClean="0"/>
-              <a:t>Shamash to </a:t>
-            </a:r>
-            <a:r>
-              <a:rPr lang="en-US" dirty="0" smtClean="0"/>
-              <a:t>relight!</a:t>
+              <a:t>If the VR person strays too far from the path, their torch blows out.  Back to the Shamash to relight!</a:t>
             </a:r>
             <a:endParaRPr lang="en-US" dirty="0"/>
           </a:p>
@@ -6924,11 +6909,7 @@
             <a:pPr algn="ctr"/>
             <a:r>
               <a:rPr lang="en-US" dirty="0" smtClean="0"/>
-              <a:t>Ste</a:t>
-            </a:r>
-            <a:r>
-              <a:rPr lang="en-US" dirty="0" smtClean="0"/>
-              <a:t>p through the door and the torch carrier is in another land.  There are many ways to go, but the lantern carrier knows the way.  Onward!</a:t>
+              <a:t>Step through the door and the torch carrier is in another land.  There are many ways to go, but the lantern carrier knows the way.  Onward!</a:t>
             </a:r>
             <a:endParaRPr lang="en-US" dirty="0"/>
           </a:p>
@@ -14326,6 +14307,971 @@
     <p:extLst>
       <p:ext uri="{BB962C8B-B14F-4D97-AF65-F5344CB8AC3E}">
         <p14:creationId xmlns:p14="http://schemas.microsoft.com/office/powerpoint/2010/main" val="4141515442"/>
+      </p:ext>
+    </p:extLst>
+  </p:cSld>
+  <p:clrMapOvr>
+    <a:masterClrMapping/>
+  </p:clrMapOvr>
+  <p:timing>
+    <p:tnLst>
+      <p:par>
+        <p:cTn id="1" dur="indefinite" restart="never" nodeType="tmRoot"/>
+      </p:par>
+    </p:tnLst>
+  </p:timing>
+</p:sld>
+</file>
+
+<file path=ppt/slides/slide23.xml><?xml version="1.0" encoding="utf-8"?>
+<p:sld xmlns:a="http://schemas.openxmlformats.org/drawingml/2006/main" xmlns:r="http://schemas.openxmlformats.org/officeDocument/2006/relationships" xmlns:p="http://schemas.openxmlformats.org/presentationml/2006/main">
+  <p:cSld>
+    <p:spTree>
+      <p:nvGrpSpPr>
+        <p:cNvPr id="1" name=""/>
+        <p:cNvGrpSpPr/>
+        <p:nvPr/>
+      </p:nvGrpSpPr>
+      <p:grpSpPr>
+        <a:xfrm>
+          <a:off x="0" y="0"/>
+          <a:ext cx="0" cy="0"/>
+          <a:chOff x="0" y="0"/>
+          <a:chExt cx="0" cy="0"/>
+        </a:xfrm>
+      </p:grpSpPr>
+      <p:sp>
+        <p:nvSpPr>
+          <p:cNvPr id="2" name="Title 1"/>
+          <p:cNvSpPr>
+            <a:spLocks noGrp="1"/>
+          </p:cNvSpPr>
+          <p:nvPr>
+            <p:ph type="title"/>
+          </p:nvPr>
+        </p:nvSpPr>
+        <p:spPr>
+          <a:xfrm>
+            <a:off x="-434010" y="287097"/>
+            <a:ext cx="12811539" cy="1325563"/>
+          </a:xfrm>
+        </p:spPr>
+        <p:txBody>
+          <a:bodyPr>
+            <a:noAutofit/>
+          </a:bodyPr>
+          <a:lstStyle/>
+          <a:p>
+            <a:pPr algn="ctr"/>
+            <a:r>
+              <a:rPr lang="en-US" sz="3600" dirty="0" smtClean="0"/>
+              <a:t>State Diagram</a:t>
+            </a:r>
+            <a:endParaRPr lang="en-US" sz="3600" dirty="0"/>
+          </a:p>
+        </p:txBody>
+      </p:sp>
+      <p:sp>
+        <p:nvSpPr>
+          <p:cNvPr id="6" name="Rectangle 5"/>
+          <p:cNvSpPr/>
+          <p:nvPr/>
+        </p:nvSpPr>
+        <p:spPr>
+          <a:xfrm>
+            <a:off x="228600" y="3228976"/>
+            <a:ext cx="1357313" cy="628650"/>
+          </a:xfrm>
+          <a:prstGeom prst="rect">
+            <a:avLst/>
+          </a:prstGeom>
+        </p:spPr>
+        <p:style>
+          <a:lnRef idx="2">
+            <a:schemeClr val="accent2">
+              <a:shade val="50000"/>
+            </a:schemeClr>
+          </a:lnRef>
+          <a:fillRef idx="1">
+            <a:schemeClr val="accent2"/>
+          </a:fillRef>
+          <a:effectRef idx="0">
+            <a:schemeClr val="accent2"/>
+          </a:effectRef>
+          <a:fontRef idx="minor">
+            <a:schemeClr val="lt1"/>
+          </a:fontRef>
+        </p:style>
+        <p:txBody>
+          <a:bodyPr rtlCol="0" anchor="ctr"/>
+          <a:lstStyle/>
+          <a:p>
+            <a:pPr algn="ctr"/>
+            <a:r>
+              <a:rPr lang="en-US" b="1" dirty="0" smtClean="0">
+                <a:solidFill>
+                  <a:schemeClr val="tx1"/>
+                </a:solidFill>
+              </a:rPr>
+              <a:t>Getting Ready</a:t>
+            </a:r>
+            <a:endParaRPr lang="en-US" b="1" dirty="0">
+              <a:solidFill>
+                <a:schemeClr val="tx1"/>
+              </a:solidFill>
+            </a:endParaRPr>
+          </a:p>
+        </p:txBody>
+      </p:sp>
+      <p:sp>
+        <p:nvSpPr>
+          <p:cNvPr id="32" name="Rectangle 31"/>
+          <p:cNvSpPr/>
+          <p:nvPr/>
+        </p:nvSpPr>
+        <p:spPr>
+          <a:xfrm>
+            <a:off x="2266950" y="3228976"/>
+            <a:ext cx="1357313" cy="628650"/>
+          </a:xfrm>
+          <a:prstGeom prst="rect">
+            <a:avLst/>
+          </a:prstGeom>
+        </p:spPr>
+        <p:style>
+          <a:lnRef idx="2">
+            <a:schemeClr val="accent2">
+              <a:shade val="50000"/>
+            </a:schemeClr>
+          </a:lnRef>
+          <a:fillRef idx="1">
+            <a:schemeClr val="accent2"/>
+          </a:fillRef>
+          <a:effectRef idx="0">
+            <a:schemeClr val="accent2"/>
+          </a:effectRef>
+          <a:fontRef idx="minor">
+            <a:schemeClr val="lt1"/>
+          </a:fontRef>
+        </p:style>
+        <p:txBody>
+          <a:bodyPr rtlCol="0" anchor="ctr"/>
+          <a:lstStyle/>
+          <a:p>
+            <a:pPr algn="ctr"/>
+            <a:r>
+              <a:rPr lang="en-US" b="1" dirty="0" smtClean="0">
+                <a:solidFill>
+                  <a:schemeClr val="tx1"/>
+                </a:solidFill>
+              </a:rPr>
+              <a:t>Seeking Shamash</a:t>
+            </a:r>
+            <a:endParaRPr lang="en-US" b="1" dirty="0">
+              <a:solidFill>
+                <a:schemeClr val="tx1"/>
+              </a:solidFill>
+            </a:endParaRPr>
+          </a:p>
+        </p:txBody>
+      </p:sp>
+      <p:sp>
+        <p:nvSpPr>
+          <p:cNvPr id="37" name="Rectangle 36"/>
+          <p:cNvSpPr/>
+          <p:nvPr/>
+        </p:nvSpPr>
+        <p:spPr>
+          <a:xfrm>
+            <a:off x="4305300" y="3228976"/>
+            <a:ext cx="1357313" cy="628650"/>
+          </a:xfrm>
+          <a:prstGeom prst="rect">
+            <a:avLst/>
+          </a:prstGeom>
+        </p:spPr>
+        <p:style>
+          <a:lnRef idx="2">
+            <a:schemeClr val="accent2">
+              <a:shade val="50000"/>
+            </a:schemeClr>
+          </a:lnRef>
+          <a:fillRef idx="1">
+            <a:schemeClr val="accent2"/>
+          </a:fillRef>
+          <a:effectRef idx="0">
+            <a:schemeClr val="accent2"/>
+          </a:effectRef>
+          <a:fontRef idx="minor">
+            <a:schemeClr val="lt1"/>
+          </a:fontRef>
+        </p:style>
+        <p:txBody>
+          <a:bodyPr rtlCol="0" anchor="ctr"/>
+          <a:lstStyle/>
+          <a:p>
+            <a:pPr algn="ctr"/>
+            <a:r>
+              <a:rPr lang="en-US" b="1" dirty="0" smtClean="0">
+                <a:solidFill>
+                  <a:schemeClr val="tx1"/>
+                </a:solidFill>
+              </a:rPr>
+              <a:t>Near Shamash</a:t>
+            </a:r>
+            <a:endParaRPr lang="en-US" b="1" dirty="0">
+              <a:solidFill>
+                <a:schemeClr val="tx1"/>
+              </a:solidFill>
+            </a:endParaRPr>
+          </a:p>
+        </p:txBody>
+      </p:sp>
+      <p:sp>
+        <p:nvSpPr>
+          <p:cNvPr id="38" name="Rectangle 37"/>
+          <p:cNvSpPr/>
+          <p:nvPr/>
+        </p:nvSpPr>
+        <p:spPr>
+          <a:xfrm>
+            <a:off x="6343650" y="3228976"/>
+            <a:ext cx="1357313" cy="628650"/>
+          </a:xfrm>
+          <a:prstGeom prst="rect">
+            <a:avLst/>
+          </a:prstGeom>
+        </p:spPr>
+        <p:style>
+          <a:lnRef idx="2">
+            <a:schemeClr val="accent2">
+              <a:shade val="50000"/>
+            </a:schemeClr>
+          </a:lnRef>
+          <a:fillRef idx="1">
+            <a:schemeClr val="accent2"/>
+          </a:fillRef>
+          <a:effectRef idx="0">
+            <a:schemeClr val="accent2"/>
+          </a:effectRef>
+          <a:fontRef idx="minor">
+            <a:schemeClr val="lt1"/>
+          </a:fontRef>
+        </p:style>
+        <p:txBody>
+          <a:bodyPr rtlCol="0" anchor="ctr"/>
+          <a:lstStyle/>
+          <a:p>
+            <a:pPr algn="ctr"/>
+            <a:r>
+              <a:rPr lang="en-US" b="1" dirty="0" smtClean="0">
+                <a:solidFill>
+                  <a:schemeClr val="tx1"/>
+                </a:solidFill>
+              </a:rPr>
+              <a:t>Seeking Candle</a:t>
+            </a:r>
+            <a:endParaRPr lang="en-US" b="1" dirty="0">
+              <a:solidFill>
+                <a:schemeClr val="tx1"/>
+              </a:solidFill>
+            </a:endParaRPr>
+          </a:p>
+        </p:txBody>
+      </p:sp>
+      <p:sp>
+        <p:nvSpPr>
+          <p:cNvPr id="39" name="Rectangle 38"/>
+          <p:cNvSpPr/>
+          <p:nvPr/>
+        </p:nvSpPr>
+        <p:spPr>
+          <a:xfrm>
+            <a:off x="7379493" y="1780994"/>
+            <a:ext cx="1435894" cy="628650"/>
+          </a:xfrm>
+          <a:prstGeom prst="rect">
+            <a:avLst/>
+          </a:prstGeom>
+        </p:spPr>
+        <p:style>
+          <a:lnRef idx="2">
+            <a:schemeClr val="accent2">
+              <a:shade val="50000"/>
+            </a:schemeClr>
+          </a:lnRef>
+          <a:fillRef idx="1">
+            <a:schemeClr val="accent2"/>
+          </a:fillRef>
+          <a:effectRef idx="0">
+            <a:schemeClr val="accent2"/>
+          </a:effectRef>
+          <a:fontRef idx="minor">
+            <a:schemeClr val="lt1"/>
+          </a:fontRef>
+        </p:style>
+        <p:txBody>
+          <a:bodyPr rtlCol="0" anchor="ctr"/>
+          <a:lstStyle/>
+          <a:p>
+            <a:pPr algn="ctr"/>
+            <a:r>
+              <a:rPr lang="en-US" b="1" dirty="0" smtClean="0">
+                <a:solidFill>
+                  <a:schemeClr val="tx1"/>
+                </a:solidFill>
+              </a:rPr>
+              <a:t>Flame Extinguished</a:t>
+            </a:r>
+            <a:endParaRPr lang="en-US" b="1" dirty="0">
+              <a:solidFill>
+                <a:schemeClr val="tx1"/>
+              </a:solidFill>
+            </a:endParaRPr>
+          </a:p>
+        </p:txBody>
+      </p:sp>
+      <p:sp>
+        <p:nvSpPr>
+          <p:cNvPr id="40" name="Rectangle 39"/>
+          <p:cNvSpPr/>
+          <p:nvPr/>
+        </p:nvSpPr>
+        <p:spPr>
+          <a:xfrm>
+            <a:off x="8236743" y="3139223"/>
+            <a:ext cx="1435894" cy="808158"/>
+          </a:xfrm>
+          <a:prstGeom prst="rect">
+            <a:avLst/>
+          </a:prstGeom>
+        </p:spPr>
+        <p:style>
+          <a:lnRef idx="2">
+            <a:schemeClr val="accent2">
+              <a:shade val="50000"/>
+            </a:schemeClr>
+          </a:lnRef>
+          <a:fillRef idx="1">
+            <a:schemeClr val="accent2"/>
+          </a:fillRef>
+          <a:effectRef idx="0">
+            <a:schemeClr val="accent2"/>
+          </a:effectRef>
+          <a:fontRef idx="minor">
+            <a:schemeClr val="lt1"/>
+          </a:fontRef>
+        </p:style>
+        <p:txBody>
+          <a:bodyPr rtlCol="0" anchor="ctr"/>
+          <a:lstStyle/>
+          <a:p>
+            <a:pPr algn="ctr"/>
+            <a:r>
+              <a:rPr lang="en-US" b="1" dirty="0" smtClean="0">
+                <a:solidFill>
+                  <a:schemeClr val="tx1"/>
+                </a:solidFill>
+              </a:rPr>
+              <a:t>Through Entrance Portal</a:t>
+            </a:r>
+            <a:endParaRPr lang="en-US" b="1" dirty="0">
+              <a:solidFill>
+                <a:schemeClr val="tx1"/>
+              </a:solidFill>
+            </a:endParaRPr>
+          </a:p>
+        </p:txBody>
+      </p:sp>
+      <p:sp>
+        <p:nvSpPr>
+          <p:cNvPr id="41" name="Rectangle 40"/>
+          <p:cNvSpPr/>
+          <p:nvPr/>
+        </p:nvSpPr>
+        <p:spPr>
+          <a:xfrm>
+            <a:off x="10390584" y="3228976"/>
+            <a:ext cx="1435894" cy="628650"/>
+          </a:xfrm>
+          <a:prstGeom prst="rect">
+            <a:avLst/>
+          </a:prstGeom>
+        </p:spPr>
+        <p:style>
+          <a:lnRef idx="2">
+            <a:schemeClr val="accent2">
+              <a:shade val="50000"/>
+            </a:schemeClr>
+          </a:lnRef>
+          <a:fillRef idx="1">
+            <a:schemeClr val="accent2"/>
+          </a:fillRef>
+          <a:effectRef idx="0">
+            <a:schemeClr val="accent2"/>
+          </a:effectRef>
+          <a:fontRef idx="minor">
+            <a:schemeClr val="lt1"/>
+          </a:fontRef>
+        </p:style>
+        <p:txBody>
+          <a:bodyPr rtlCol="0" anchor="ctr"/>
+          <a:lstStyle/>
+          <a:p>
+            <a:pPr algn="ctr"/>
+            <a:r>
+              <a:rPr lang="en-US" b="1" dirty="0" smtClean="0">
+                <a:solidFill>
+                  <a:schemeClr val="tx1"/>
+                </a:solidFill>
+              </a:rPr>
+              <a:t>Through Exit Portal</a:t>
+            </a:r>
+            <a:endParaRPr lang="en-US" b="1" dirty="0">
+              <a:solidFill>
+                <a:schemeClr val="tx1"/>
+              </a:solidFill>
+            </a:endParaRPr>
+          </a:p>
+        </p:txBody>
+      </p:sp>
+      <p:sp>
+        <p:nvSpPr>
+          <p:cNvPr id="42" name="Rectangle 41"/>
+          <p:cNvSpPr/>
+          <p:nvPr/>
+        </p:nvSpPr>
+        <p:spPr>
+          <a:xfrm>
+            <a:off x="6800849" y="4822946"/>
+            <a:ext cx="1435894" cy="628650"/>
+          </a:xfrm>
+          <a:prstGeom prst="rect">
+            <a:avLst/>
+          </a:prstGeom>
+        </p:spPr>
+        <p:style>
+          <a:lnRef idx="2">
+            <a:schemeClr val="accent2">
+              <a:shade val="50000"/>
+            </a:schemeClr>
+          </a:lnRef>
+          <a:fillRef idx="1">
+            <a:schemeClr val="accent2"/>
+          </a:fillRef>
+          <a:effectRef idx="0">
+            <a:schemeClr val="accent2"/>
+          </a:effectRef>
+          <a:fontRef idx="minor">
+            <a:schemeClr val="lt1"/>
+          </a:fontRef>
+        </p:style>
+        <p:txBody>
+          <a:bodyPr rtlCol="0" anchor="ctr"/>
+          <a:lstStyle/>
+          <a:p>
+            <a:pPr algn="ctr"/>
+            <a:r>
+              <a:rPr lang="en-US" b="1" dirty="0" smtClean="0">
+                <a:solidFill>
+                  <a:schemeClr val="tx1"/>
+                </a:solidFill>
+              </a:rPr>
+              <a:t>Candle Lit</a:t>
+            </a:r>
+            <a:endParaRPr lang="en-US" b="1" dirty="0">
+              <a:solidFill>
+                <a:schemeClr val="tx1"/>
+              </a:solidFill>
+            </a:endParaRPr>
+          </a:p>
+        </p:txBody>
+      </p:sp>
+      <p:cxnSp>
+        <p:nvCxnSpPr>
+          <p:cNvPr id="11" name="Straight Arrow Connector 10"/>
+          <p:cNvCxnSpPr>
+            <a:stCxn id="6" idx="3"/>
+            <a:endCxn id="32" idx="1"/>
+          </p:cNvCxnSpPr>
+          <p:nvPr/>
+        </p:nvCxnSpPr>
+        <p:spPr>
+          <a:xfrm>
+            <a:off x="1585913" y="3543301"/>
+            <a:ext cx="681037" cy="0"/>
+          </a:xfrm>
+          <a:prstGeom prst="straightConnector1">
+            <a:avLst/>
+          </a:prstGeom>
+          <a:ln>
+            <a:tailEnd type="triangle"/>
+          </a:ln>
+        </p:spPr>
+        <p:style>
+          <a:lnRef idx="3">
+            <a:schemeClr val="accent5"/>
+          </a:lnRef>
+          <a:fillRef idx="0">
+            <a:schemeClr val="accent5"/>
+          </a:fillRef>
+          <a:effectRef idx="2">
+            <a:schemeClr val="accent5"/>
+          </a:effectRef>
+          <a:fontRef idx="minor">
+            <a:schemeClr val="tx1"/>
+          </a:fontRef>
+        </p:style>
+      </p:cxnSp>
+      <p:cxnSp>
+        <p:nvCxnSpPr>
+          <p:cNvPr id="16" name="Straight Arrow Connector 15"/>
+          <p:cNvCxnSpPr>
+            <a:stCxn id="32" idx="3"/>
+            <a:endCxn id="37" idx="1"/>
+          </p:cNvCxnSpPr>
+          <p:nvPr/>
+        </p:nvCxnSpPr>
+        <p:spPr>
+          <a:xfrm>
+            <a:off x="3624263" y="3543301"/>
+            <a:ext cx="681037" cy="0"/>
+          </a:xfrm>
+          <a:prstGeom prst="straightConnector1">
+            <a:avLst/>
+          </a:prstGeom>
+          <a:ln>
+            <a:tailEnd type="triangle"/>
+          </a:ln>
+        </p:spPr>
+        <p:style>
+          <a:lnRef idx="3">
+            <a:schemeClr val="accent5"/>
+          </a:lnRef>
+          <a:fillRef idx="0">
+            <a:schemeClr val="accent5"/>
+          </a:fillRef>
+          <a:effectRef idx="2">
+            <a:schemeClr val="accent5"/>
+          </a:effectRef>
+          <a:fontRef idx="minor">
+            <a:schemeClr val="tx1"/>
+          </a:fontRef>
+        </p:style>
+      </p:cxnSp>
+      <p:cxnSp>
+        <p:nvCxnSpPr>
+          <p:cNvPr id="43" name="Straight Arrow Connector 42"/>
+          <p:cNvCxnSpPr>
+            <a:stCxn id="37" idx="3"/>
+            <a:endCxn id="38" idx="1"/>
+          </p:cNvCxnSpPr>
+          <p:nvPr/>
+        </p:nvCxnSpPr>
+        <p:spPr>
+          <a:xfrm>
+            <a:off x="5662613" y="3543301"/>
+            <a:ext cx="681037" cy="0"/>
+          </a:xfrm>
+          <a:prstGeom prst="straightConnector1">
+            <a:avLst/>
+          </a:prstGeom>
+          <a:ln>
+            <a:tailEnd type="triangle"/>
+          </a:ln>
+        </p:spPr>
+        <p:style>
+          <a:lnRef idx="3">
+            <a:schemeClr val="accent5"/>
+          </a:lnRef>
+          <a:fillRef idx="0">
+            <a:schemeClr val="accent5"/>
+          </a:fillRef>
+          <a:effectRef idx="2">
+            <a:schemeClr val="accent5"/>
+          </a:effectRef>
+          <a:fontRef idx="minor">
+            <a:schemeClr val="tx1"/>
+          </a:fontRef>
+        </p:style>
+      </p:cxnSp>
+      <p:cxnSp>
+        <p:nvCxnSpPr>
+          <p:cNvPr id="45" name="Straight Arrow Connector 44"/>
+          <p:cNvCxnSpPr>
+            <a:stCxn id="38" idx="3"/>
+            <a:endCxn id="40" idx="1"/>
+          </p:cNvCxnSpPr>
+          <p:nvPr/>
+        </p:nvCxnSpPr>
+        <p:spPr>
+          <a:xfrm>
+            <a:off x="7700963" y="3543301"/>
+            <a:ext cx="535780" cy="1"/>
+          </a:xfrm>
+          <a:prstGeom prst="straightConnector1">
+            <a:avLst/>
+          </a:prstGeom>
+          <a:ln>
+            <a:tailEnd type="triangle"/>
+          </a:ln>
+        </p:spPr>
+        <p:style>
+          <a:lnRef idx="3">
+            <a:schemeClr val="accent5"/>
+          </a:lnRef>
+          <a:fillRef idx="0">
+            <a:schemeClr val="accent5"/>
+          </a:fillRef>
+          <a:effectRef idx="2">
+            <a:schemeClr val="accent5"/>
+          </a:effectRef>
+          <a:fontRef idx="minor">
+            <a:schemeClr val="tx1"/>
+          </a:fontRef>
+        </p:style>
+      </p:cxnSp>
+      <p:cxnSp>
+        <p:nvCxnSpPr>
+          <p:cNvPr id="47" name="Straight Arrow Connector 46"/>
+          <p:cNvCxnSpPr>
+            <a:stCxn id="40" idx="3"/>
+            <a:endCxn id="41" idx="1"/>
+          </p:cNvCxnSpPr>
+          <p:nvPr/>
+        </p:nvCxnSpPr>
+        <p:spPr>
+          <a:xfrm flipV="1">
+            <a:off x="9672637" y="3543301"/>
+            <a:ext cx="717947" cy="1"/>
+          </a:xfrm>
+          <a:prstGeom prst="straightConnector1">
+            <a:avLst/>
+          </a:prstGeom>
+          <a:ln>
+            <a:tailEnd type="triangle"/>
+          </a:ln>
+        </p:spPr>
+        <p:style>
+          <a:lnRef idx="3">
+            <a:schemeClr val="accent5"/>
+          </a:lnRef>
+          <a:fillRef idx="0">
+            <a:schemeClr val="accent5"/>
+          </a:fillRef>
+          <a:effectRef idx="2">
+            <a:schemeClr val="accent5"/>
+          </a:effectRef>
+          <a:fontRef idx="minor">
+            <a:schemeClr val="tx1"/>
+          </a:fontRef>
+        </p:style>
+      </p:cxnSp>
+      <p:cxnSp>
+        <p:nvCxnSpPr>
+          <p:cNvPr id="51" name="Straight Arrow Connector 50"/>
+          <p:cNvCxnSpPr>
+            <a:stCxn id="41" idx="2"/>
+            <a:endCxn id="42" idx="0"/>
+          </p:cNvCxnSpPr>
+          <p:nvPr/>
+        </p:nvCxnSpPr>
+        <p:spPr>
+          <a:xfrm flipH="1">
+            <a:off x="7518796" y="3857626"/>
+            <a:ext cx="3589735" cy="965320"/>
+          </a:xfrm>
+          <a:prstGeom prst="straightConnector1">
+            <a:avLst/>
+          </a:prstGeom>
+          <a:ln>
+            <a:tailEnd type="triangle"/>
+          </a:ln>
+        </p:spPr>
+        <p:style>
+          <a:lnRef idx="3">
+            <a:schemeClr val="accent5"/>
+          </a:lnRef>
+          <a:fillRef idx="0">
+            <a:schemeClr val="accent5"/>
+          </a:fillRef>
+          <a:effectRef idx="2">
+            <a:schemeClr val="accent5"/>
+          </a:effectRef>
+          <a:fontRef idx="minor">
+            <a:schemeClr val="tx1"/>
+          </a:fontRef>
+        </p:style>
+      </p:cxnSp>
+      <p:cxnSp>
+        <p:nvCxnSpPr>
+          <p:cNvPr id="59" name="Straight Arrow Connector 58"/>
+          <p:cNvCxnSpPr>
+            <a:stCxn id="38" idx="0"/>
+          </p:cNvCxnSpPr>
+          <p:nvPr/>
+        </p:nvCxnSpPr>
+        <p:spPr>
+          <a:xfrm flipV="1">
+            <a:off x="7022307" y="2409644"/>
+            <a:ext cx="720154" cy="819332"/>
+          </a:xfrm>
+          <a:prstGeom prst="straightConnector1">
+            <a:avLst/>
+          </a:prstGeom>
+          <a:ln>
+            <a:tailEnd type="triangle"/>
+          </a:ln>
+        </p:spPr>
+        <p:style>
+          <a:lnRef idx="3">
+            <a:schemeClr val="accent5"/>
+          </a:lnRef>
+          <a:fillRef idx="0">
+            <a:schemeClr val="accent5"/>
+          </a:fillRef>
+          <a:effectRef idx="2">
+            <a:schemeClr val="accent5"/>
+          </a:effectRef>
+          <a:fontRef idx="minor">
+            <a:schemeClr val="tx1"/>
+          </a:fontRef>
+        </p:style>
+      </p:cxnSp>
+      <p:cxnSp>
+        <p:nvCxnSpPr>
+          <p:cNvPr id="11265" name="Straight Arrow Connector 11264"/>
+          <p:cNvCxnSpPr>
+            <a:stCxn id="39" idx="1"/>
+            <a:endCxn id="32" idx="0"/>
+          </p:cNvCxnSpPr>
+          <p:nvPr/>
+        </p:nvCxnSpPr>
+        <p:spPr>
+          <a:xfrm flipH="1">
+            <a:off x="2945607" y="2095319"/>
+            <a:ext cx="4433886" cy="1133657"/>
+          </a:xfrm>
+          <a:prstGeom prst="straightConnector1">
+            <a:avLst/>
+          </a:prstGeom>
+          <a:ln>
+            <a:tailEnd type="triangle"/>
+          </a:ln>
+        </p:spPr>
+        <p:style>
+          <a:lnRef idx="3">
+            <a:schemeClr val="accent5"/>
+          </a:lnRef>
+          <a:fillRef idx="0">
+            <a:schemeClr val="accent5"/>
+          </a:fillRef>
+          <a:effectRef idx="2">
+            <a:schemeClr val="accent5"/>
+          </a:effectRef>
+          <a:fontRef idx="minor">
+            <a:schemeClr val="tx1"/>
+          </a:fontRef>
+        </p:style>
+      </p:cxnSp>
+      <p:cxnSp>
+        <p:nvCxnSpPr>
+          <p:cNvPr id="11272" name="Straight Arrow Connector 11271"/>
+          <p:cNvCxnSpPr>
+            <a:stCxn id="40" idx="0"/>
+          </p:cNvCxnSpPr>
+          <p:nvPr/>
+        </p:nvCxnSpPr>
+        <p:spPr>
+          <a:xfrm flipH="1" flipV="1">
+            <a:off x="8421118" y="2409644"/>
+            <a:ext cx="533572" cy="729579"/>
+          </a:xfrm>
+          <a:prstGeom prst="straightConnector1">
+            <a:avLst/>
+          </a:prstGeom>
+          <a:ln>
+            <a:tailEnd type="triangle"/>
+          </a:ln>
+        </p:spPr>
+        <p:style>
+          <a:lnRef idx="3">
+            <a:schemeClr val="accent5"/>
+          </a:lnRef>
+          <a:fillRef idx="0">
+            <a:schemeClr val="accent5"/>
+          </a:fillRef>
+          <a:effectRef idx="2">
+            <a:schemeClr val="accent5"/>
+          </a:effectRef>
+          <a:fontRef idx="minor">
+            <a:schemeClr val="tx1"/>
+          </a:fontRef>
+        </p:style>
+      </p:cxnSp>
+      <p:cxnSp>
+        <p:nvCxnSpPr>
+          <p:cNvPr id="11274" name="Straight Arrow Connector 11273"/>
+          <p:cNvCxnSpPr>
+            <a:endCxn id="32" idx="2"/>
+          </p:cNvCxnSpPr>
+          <p:nvPr/>
+        </p:nvCxnSpPr>
+        <p:spPr>
+          <a:xfrm flipH="1" flipV="1">
+            <a:off x="2945607" y="3857626"/>
+            <a:ext cx="3855242" cy="965320"/>
+          </a:xfrm>
+          <a:prstGeom prst="straightConnector1">
+            <a:avLst/>
+          </a:prstGeom>
+          <a:ln>
+            <a:tailEnd type="triangle"/>
+          </a:ln>
+        </p:spPr>
+        <p:style>
+          <a:lnRef idx="3">
+            <a:schemeClr val="accent5"/>
+          </a:lnRef>
+          <a:fillRef idx="0">
+            <a:schemeClr val="accent5"/>
+          </a:fillRef>
+          <a:effectRef idx="2">
+            <a:schemeClr val="accent5"/>
+          </a:effectRef>
+          <a:fontRef idx="minor">
+            <a:schemeClr val="tx1"/>
+          </a:fontRef>
+        </p:style>
+      </p:cxnSp>
+      <p:cxnSp>
+        <p:nvCxnSpPr>
+          <p:cNvPr id="11277" name="Straight Arrow Connector 11276"/>
+          <p:cNvCxnSpPr>
+            <a:stCxn id="42" idx="1"/>
+            <a:endCxn id="6" idx="2"/>
+          </p:cNvCxnSpPr>
+          <p:nvPr/>
+        </p:nvCxnSpPr>
+        <p:spPr>
+          <a:xfrm flipH="1" flipV="1">
+            <a:off x="907257" y="3857626"/>
+            <a:ext cx="5893592" cy="1279645"/>
+          </a:xfrm>
+          <a:prstGeom prst="straightConnector1">
+            <a:avLst/>
+          </a:prstGeom>
+          <a:ln>
+            <a:tailEnd type="triangle"/>
+          </a:ln>
+        </p:spPr>
+        <p:style>
+          <a:lnRef idx="3">
+            <a:schemeClr val="accent5"/>
+          </a:lnRef>
+          <a:fillRef idx="0">
+            <a:schemeClr val="accent5"/>
+          </a:fillRef>
+          <a:effectRef idx="2">
+            <a:schemeClr val="accent5"/>
+          </a:effectRef>
+          <a:fontRef idx="minor">
+            <a:schemeClr val="tx1"/>
+          </a:fontRef>
+        </p:style>
+      </p:cxnSp>
+      <p:sp>
+        <p:nvSpPr>
+          <p:cNvPr id="111" name="Rectangle 110"/>
+          <p:cNvSpPr/>
+          <p:nvPr/>
+        </p:nvSpPr>
+        <p:spPr>
+          <a:xfrm>
+            <a:off x="6800849" y="5996349"/>
+            <a:ext cx="1435894" cy="628650"/>
+          </a:xfrm>
+          <a:prstGeom prst="rect">
+            <a:avLst/>
+          </a:prstGeom>
+        </p:spPr>
+        <p:style>
+          <a:lnRef idx="2">
+            <a:schemeClr val="accent2">
+              <a:shade val="50000"/>
+            </a:schemeClr>
+          </a:lnRef>
+          <a:fillRef idx="1">
+            <a:schemeClr val="accent2"/>
+          </a:fillRef>
+          <a:effectRef idx="0">
+            <a:schemeClr val="accent2"/>
+          </a:effectRef>
+          <a:fontRef idx="minor">
+            <a:schemeClr val="lt1"/>
+          </a:fontRef>
+        </p:style>
+        <p:txBody>
+          <a:bodyPr rtlCol="0" anchor="ctr"/>
+          <a:lstStyle/>
+          <a:p>
+            <a:pPr algn="ctr"/>
+            <a:r>
+              <a:rPr lang="en-US" b="1" dirty="0" smtClean="0">
+                <a:solidFill>
+                  <a:schemeClr val="tx1"/>
+                </a:solidFill>
+              </a:rPr>
+              <a:t>All Candles Lit</a:t>
+            </a:r>
+            <a:endParaRPr lang="en-US" b="1" dirty="0">
+              <a:solidFill>
+                <a:schemeClr val="tx1"/>
+              </a:solidFill>
+            </a:endParaRPr>
+          </a:p>
+        </p:txBody>
+      </p:sp>
+      <p:cxnSp>
+        <p:nvCxnSpPr>
+          <p:cNvPr id="11308" name="Straight Arrow Connector 11307"/>
+          <p:cNvCxnSpPr>
+            <a:stCxn id="42" idx="2"/>
+            <a:endCxn id="111" idx="0"/>
+          </p:cNvCxnSpPr>
+          <p:nvPr/>
+        </p:nvCxnSpPr>
+        <p:spPr>
+          <a:xfrm>
+            <a:off x="7518796" y="5451596"/>
+            <a:ext cx="0" cy="544753"/>
+          </a:xfrm>
+          <a:prstGeom prst="straightConnector1">
+            <a:avLst/>
+          </a:prstGeom>
+          <a:ln>
+            <a:tailEnd type="triangle"/>
+          </a:ln>
+        </p:spPr>
+        <p:style>
+          <a:lnRef idx="3">
+            <a:schemeClr val="accent5"/>
+          </a:lnRef>
+          <a:fillRef idx="0">
+            <a:schemeClr val="accent5"/>
+          </a:fillRef>
+          <a:effectRef idx="2">
+            <a:schemeClr val="accent5"/>
+          </a:effectRef>
+          <a:fontRef idx="minor">
+            <a:schemeClr val="tx1"/>
+          </a:fontRef>
+        </p:style>
+      </p:cxnSp>
+    </p:spTree>
+    <p:extLst>
+      <p:ext uri="{BB962C8B-B14F-4D97-AF65-F5344CB8AC3E}">
+        <p14:creationId xmlns:p14="http://schemas.microsoft.com/office/powerpoint/2010/main" val="3373784293"/>
       </p:ext>
     </p:extLst>
   </p:cSld>

</xml_diff>

<commit_message>
fixed some bugs with lights
Testing the physical lights and needed to fix some issues with how the
EL wire paths are triggered. also got the "Test Lights" checkbox
working, for a quick test that all the lights are hooked up right.
</commit_message>
<xml_diff>
--- a/docs/8NightsVRDesign_Rev2.pptx
+++ b/docs/8NightsVRDesign_Rev2.pptx
@@ -265,7 +265,7 @@
           <a:p>
             <a:fld id="{8A733DA4-D56C-479F-9AE8-3CF782CB7FF4}" type="datetimeFigureOut">
               <a:rPr lang="en-US" smtClean="0"/>
-              <a:t>10/25/2015</a:t>
+              <a:t>11/1/2015</a:t>
             </a:fld>
             <a:endParaRPr lang="en-US"/>
           </a:p>
@@ -435,7 +435,7 @@
           <a:p>
             <a:fld id="{8A733DA4-D56C-479F-9AE8-3CF782CB7FF4}" type="datetimeFigureOut">
               <a:rPr lang="en-US" smtClean="0"/>
-              <a:t>10/25/2015</a:t>
+              <a:t>11/1/2015</a:t>
             </a:fld>
             <a:endParaRPr lang="en-US"/>
           </a:p>
@@ -615,7 +615,7 @@
           <a:p>
             <a:fld id="{8A733DA4-D56C-479F-9AE8-3CF782CB7FF4}" type="datetimeFigureOut">
               <a:rPr lang="en-US" smtClean="0"/>
-              <a:t>10/25/2015</a:t>
+              <a:t>11/1/2015</a:t>
             </a:fld>
             <a:endParaRPr lang="en-US"/>
           </a:p>
@@ -785,7 +785,7 @@
           <a:p>
             <a:fld id="{8A733DA4-D56C-479F-9AE8-3CF782CB7FF4}" type="datetimeFigureOut">
               <a:rPr lang="en-US" smtClean="0"/>
-              <a:t>10/25/2015</a:t>
+              <a:t>11/1/2015</a:t>
             </a:fld>
             <a:endParaRPr lang="en-US"/>
           </a:p>
@@ -1031,7 +1031,7 @@
           <a:p>
             <a:fld id="{8A733DA4-D56C-479F-9AE8-3CF782CB7FF4}" type="datetimeFigureOut">
               <a:rPr lang="en-US" smtClean="0"/>
-              <a:t>10/25/2015</a:t>
+              <a:t>11/1/2015</a:t>
             </a:fld>
             <a:endParaRPr lang="en-US"/>
           </a:p>
@@ -1263,7 +1263,7 @@
           <a:p>
             <a:fld id="{8A733DA4-D56C-479F-9AE8-3CF782CB7FF4}" type="datetimeFigureOut">
               <a:rPr lang="en-US" smtClean="0"/>
-              <a:t>10/25/2015</a:t>
+              <a:t>11/1/2015</a:t>
             </a:fld>
             <a:endParaRPr lang="en-US"/>
           </a:p>
@@ -1630,7 +1630,7 @@
           <a:p>
             <a:fld id="{8A733DA4-D56C-479F-9AE8-3CF782CB7FF4}" type="datetimeFigureOut">
               <a:rPr lang="en-US" smtClean="0"/>
-              <a:t>10/25/2015</a:t>
+              <a:t>11/1/2015</a:t>
             </a:fld>
             <a:endParaRPr lang="en-US"/>
           </a:p>
@@ -1748,7 +1748,7 @@
           <a:p>
             <a:fld id="{8A733DA4-D56C-479F-9AE8-3CF782CB7FF4}" type="datetimeFigureOut">
               <a:rPr lang="en-US" smtClean="0"/>
-              <a:t>10/25/2015</a:t>
+              <a:t>11/1/2015</a:t>
             </a:fld>
             <a:endParaRPr lang="en-US"/>
           </a:p>
@@ -1843,7 +1843,7 @@
           <a:p>
             <a:fld id="{8A733DA4-D56C-479F-9AE8-3CF782CB7FF4}" type="datetimeFigureOut">
               <a:rPr lang="en-US" smtClean="0"/>
-              <a:t>10/25/2015</a:t>
+              <a:t>11/1/2015</a:t>
             </a:fld>
             <a:endParaRPr lang="en-US"/>
           </a:p>
@@ -2120,7 +2120,7 @@
           <a:p>
             <a:fld id="{8A733DA4-D56C-479F-9AE8-3CF782CB7FF4}" type="datetimeFigureOut">
               <a:rPr lang="en-US" smtClean="0"/>
-              <a:t>10/25/2015</a:t>
+              <a:t>11/1/2015</a:t>
             </a:fld>
             <a:endParaRPr lang="en-US"/>
           </a:p>
@@ -2373,7 +2373,7 @@
           <a:p>
             <a:fld id="{8A733DA4-D56C-479F-9AE8-3CF782CB7FF4}" type="datetimeFigureOut">
               <a:rPr lang="en-US" smtClean="0"/>
-              <a:t>10/25/2015</a:t>
+              <a:t>11/1/2015</a:t>
             </a:fld>
             <a:endParaRPr lang="en-US"/>
           </a:p>
@@ -2586,7 +2586,7 @@
           <a:p>
             <a:fld id="{8A733DA4-D56C-479F-9AE8-3CF782CB7FF4}" type="datetimeFigureOut">
               <a:rPr lang="en-US" smtClean="0"/>
-              <a:t>10/25/2015</a:t>
+              <a:t>11/1/2015</a:t>
             </a:fld>
             <a:endParaRPr lang="en-US"/>
           </a:p>
@@ -14352,7 +14352,7 @@
         </p:nvSpPr>
         <p:spPr>
           <a:xfrm>
-            <a:off x="-434010" y="287097"/>
+            <a:off x="-402639" y="17648"/>
             <a:ext cx="12811539" cy="1325563"/>
           </a:xfrm>
         </p:spPr>
@@ -14364,10 +14364,10 @@
           <a:p>
             <a:pPr algn="ctr"/>
             <a:r>
-              <a:rPr lang="en-US" sz="3600" dirty="0" smtClean="0"/>
+              <a:rPr lang="en-US" sz="3600" b="1" dirty="0" smtClean="0"/>
               <a:t>State Diagram</a:t>
             </a:r>
-            <a:endParaRPr lang="en-US" sz="3600" dirty="0"/>
+            <a:endParaRPr lang="en-US" sz="3600" b="1" dirty="0"/>
           </a:p>
         </p:txBody>
       </p:sp>

</xml_diff>